<commit_message>
:sparkles: Added Bad Ducky (BlueTeam -Easy)
</commit_message>
<xml_diff>
--- a/Marketing/NeulandCTF.pptx
+++ b/Marketing/NeulandCTF.pptx
@@ -22463,36 +22463,6 @@
       </p:grpSpPr>
       <p:pic>
         <p:nvPicPr>
-          <p:cNvPr id="5" name="Grafik 4" descr="Ein Bild, das Text enthält.&#10;&#10;Automatisch generierte Beschreibung">
-            <a:extLst>
-              <a:ext uri="{FF2B5EF4-FFF2-40B4-BE49-F238E27FC236}">
-                <a16:creationId xmlns:a16="http://schemas.microsoft.com/office/drawing/2014/main" id="{DDF8A2B4-6C4C-4114-BF0F-E47C4D1BF8D0}"/>
-              </a:ext>
-            </a:extLst>
-          </p:cNvPr>
-          <p:cNvPicPr>
-            <a:picLocks noChangeAspect="1"/>
-          </p:cNvPicPr>
-          <p:nvPr/>
-        </p:nvPicPr>
-        <p:blipFill>
-          <a:blip r:embed="rId2"/>
-          <a:stretch>
-            <a:fillRect/>
-          </a:stretch>
-        </p:blipFill>
-        <p:spPr>
-          <a:xfrm>
-            <a:off x="1346857" y="845499"/>
-            <a:ext cx="3184998" cy="613541"/>
-          </a:xfrm>
-          <a:prstGeom prst="rect">
-            <a:avLst/>
-          </a:prstGeom>
-        </p:spPr>
-      </p:pic>
-      <p:pic>
-        <p:nvPicPr>
           <p:cNvPr id="3" name="Grafik 2">
             <a:extLst>
               <a:ext uri="{FF2B5EF4-FFF2-40B4-BE49-F238E27FC236}">
@@ -22506,10 +22476,10 @@
           <p:nvPr/>
         </p:nvPicPr>
         <p:blipFill>
-          <a:blip r:embed="rId3">
+          <a:blip r:embed="rId2">
             <a:extLst>
               <a:ext uri="{96DAC541-7B7A-43D3-8B79-37D633B846F1}">
-                <asvg:svgBlip xmlns:asvg="http://schemas.microsoft.com/office/drawing/2016/SVG/main" r:embed="rId4"/>
+                <asvg:svgBlip xmlns:asvg="http://schemas.microsoft.com/office/drawing/2016/SVG/main" r:embed="rId3"/>
               </a:ext>
             </a:extLst>
           </a:blip>
@@ -22542,7 +22512,7 @@
           <p:nvPr/>
         </p:nvPicPr>
         <p:blipFill>
-          <a:blip r:embed="rId5"/>
+          <a:blip r:embed="rId4"/>
           <a:stretch>
             <a:fillRect/>
           </a:stretch>
@@ -22551,36 +22521,6 @@
           <a:xfrm>
             <a:off x="8343013" y="424086"/>
             <a:ext cx="550787" cy="700248"/>
-          </a:xfrm>
-          <a:prstGeom prst="rect">
-            <a:avLst/>
-          </a:prstGeom>
-        </p:spPr>
-      </p:pic>
-      <p:pic>
-        <p:nvPicPr>
-          <p:cNvPr id="13" name="Grafik 12" descr="Ein Bild, das Text, Schrift, Grafiken, Screenshot enthält.&#10;&#10;Automatisch generierte Beschreibung">
-            <a:extLst>
-              <a:ext uri="{FF2B5EF4-FFF2-40B4-BE49-F238E27FC236}">
-                <a16:creationId xmlns:a16="http://schemas.microsoft.com/office/drawing/2014/main" id="{F720AD83-95CD-494E-FF85-F4A5F5BDAEFF}"/>
-              </a:ext>
-            </a:extLst>
-          </p:cNvPr>
-          <p:cNvPicPr>
-            <a:picLocks noChangeAspect="1"/>
-          </p:cNvPicPr>
-          <p:nvPr/>
-        </p:nvPicPr>
-        <p:blipFill>
-          <a:blip r:embed="rId6"/>
-          <a:stretch>
-            <a:fillRect/>
-          </a:stretch>
-        </p:blipFill>
-        <p:spPr>
-          <a:xfrm>
-            <a:off x="3756838" y="1836484"/>
-            <a:ext cx="3335780" cy="612428"/>
           </a:xfrm>
           <a:prstGeom prst="rect">
             <a:avLst/>
@@ -22602,7 +22542,7 @@
           <p:nvPr/>
         </p:nvPicPr>
         <p:blipFill>
-          <a:blip r:embed="rId7"/>
+          <a:blip r:embed="rId5"/>
           <a:stretch>
             <a:fillRect/>
           </a:stretch>
@@ -22611,6 +22551,66 @@
           <a:xfrm>
             <a:off x="5674928" y="3000802"/>
             <a:ext cx="3076384" cy="523007"/>
+          </a:xfrm>
+          <a:prstGeom prst="rect">
+            <a:avLst/>
+          </a:prstGeom>
+        </p:spPr>
+      </p:pic>
+      <p:pic>
+        <p:nvPicPr>
+          <p:cNvPr id="10" name="Grafik 9" descr="Ein Bild, das Schrift, Symbol, Logo, Grafiken enthält.&#10;&#10;Automatisch generierte Beschreibung">
+            <a:extLst>
+              <a:ext uri="{FF2B5EF4-FFF2-40B4-BE49-F238E27FC236}">
+                <a16:creationId xmlns:a16="http://schemas.microsoft.com/office/drawing/2014/main" id="{B8F68738-18D3-9A5E-2104-555EA1D7CE79}"/>
+              </a:ext>
+            </a:extLst>
+          </p:cNvPr>
+          <p:cNvPicPr>
+            <a:picLocks noChangeAspect="1"/>
+          </p:cNvPicPr>
+          <p:nvPr/>
+        </p:nvPicPr>
+        <p:blipFill>
+          <a:blip r:embed="rId6"/>
+          <a:stretch>
+            <a:fillRect/>
+          </a:stretch>
+        </p:blipFill>
+        <p:spPr>
+          <a:xfrm>
+            <a:off x="1178861" y="775116"/>
+            <a:ext cx="3625104" cy="698436"/>
+          </a:xfrm>
+          <a:prstGeom prst="rect">
+            <a:avLst/>
+          </a:prstGeom>
+        </p:spPr>
+      </p:pic>
+      <p:pic>
+        <p:nvPicPr>
+          <p:cNvPr id="12" name="Grafik 11" descr="Ein Bild, das Text, Schrift, Grafiken, Grafikdesign enthält.&#10;&#10;Automatisch generierte Beschreibung">
+            <a:extLst>
+              <a:ext uri="{FF2B5EF4-FFF2-40B4-BE49-F238E27FC236}">
+                <a16:creationId xmlns:a16="http://schemas.microsoft.com/office/drawing/2014/main" id="{C7EB89B5-0A7E-3C3E-55B8-837A433D1C17}"/>
+              </a:ext>
+            </a:extLst>
+          </p:cNvPr>
+          <p:cNvPicPr>
+            <a:picLocks noChangeAspect="1"/>
+          </p:cNvPicPr>
+          <p:nvPr/>
+        </p:nvPicPr>
+        <p:blipFill>
+          <a:blip r:embed="rId7"/>
+          <a:stretch>
+            <a:fillRect/>
+          </a:stretch>
+        </p:blipFill>
+        <p:spPr>
+          <a:xfrm>
+            <a:off x="3957443" y="1934069"/>
+            <a:ext cx="3486752" cy="608232"/>
           </a:xfrm>
           <a:prstGeom prst="rect">
             <a:avLst/>

</xml_diff>

<commit_message>
:lipstick: MBDA Logo 3.0
</commit_message>
<xml_diff>
--- a/Marketing/NeulandCTF.pptx
+++ b/Marketing/NeulandCTF.pptx
@@ -22489,7 +22489,7 @@
         </p:blipFill>
         <p:spPr>
           <a:xfrm>
-            <a:off x="1346857" y="2826356"/>
+            <a:off x="793964" y="2953947"/>
             <a:ext cx="2610586" cy="995705"/>
           </a:xfrm>
           <a:prstGeom prst="rect">
@@ -22549,7 +22549,7 @@
         </p:blipFill>
         <p:spPr>
           <a:xfrm>
-            <a:off x="5674928" y="3000802"/>
+            <a:off x="5448100" y="3426645"/>
             <a:ext cx="3076384" cy="523007"/>
           </a:xfrm>
           <a:prstGeom prst="rect">
@@ -22579,7 +22579,7 @@
         </p:blipFill>
         <p:spPr>
           <a:xfrm>
-            <a:off x="1178861" y="775116"/>
+            <a:off x="1419866" y="604995"/>
             <a:ext cx="3625104" cy="698436"/>
           </a:xfrm>
           <a:prstGeom prst="rect">
@@ -22589,10 +22589,10 @@
       </p:pic>
       <p:pic>
         <p:nvPicPr>
-          <p:cNvPr id="12" name="Grafik 11" descr="Ein Bild, das Text, Schrift, Grafiken, Grafikdesign enthält.&#10;&#10;Automatisch generierte Beschreibung">
+          <p:cNvPr id="4" name="Grafik 3">
             <a:extLst>
               <a:ext uri="{FF2B5EF4-FFF2-40B4-BE49-F238E27FC236}">
-                <a16:creationId xmlns:a16="http://schemas.microsoft.com/office/drawing/2014/main" id="{C7EB89B5-0A7E-3C3E-55B8-837A433D1C17}"/>
+                <a16:creationId xmlns:a16="http://schemas.microsoft.com/office/drawing/2014/main" id="{4F85A3DC-29F0-67B4-9A69-D2B9DAA36792}"/>
               </a:ext>
             </a:extLst>
           </p:cNvPr>
@@ -22609,8 +22609,8 @@
         </p:blipFill>
         <p:spPr>
           <a:xfrm>
-            <a:off x="3957443" y="1934069"/>
-            <a:ext cx="3486752" cy="608232"/>
+            <a:off x="3541083" y="1844446"/>
+            <a:ext cx="4111746" cy="483036"/>
           </a:xfrm>
           <a:prstGeom prst="rect">
             <a:avLst/>

</xml_diff>

<commit_message>
feat: updated the slides
</commit_message>
<xml_diff>
--- a/Marketing/NeulandCTF.pptx
+++ b/Marketing/NeulandCTF.pptx
@@ -22,13 +22,6 @@
       <p:font typeface="Play" panose="020B0604020202020204" charset="0"/>
       <p:regular r:id="rId9"/>
       <p:bold r:id="rId10"/>
-    </p:embeddedFont>
-    <p:embeddedFont>
-      <p:font typeface="Source Sans Pro" panose="020B0503030403020204" pitchFamily="34" charset="0"/>
-      <p:regular r:id="rId11"/>
-      <p:bold r:id="rId12"/>
-      <p:italic r:id="rId13"/>
-      <p:boldItalic r:id="rId14"/>
     </p:embeddedFont>
   </p:embeddedFontLst>
   <p:defaultTextStyle>
@@ -277,6 +270,14 @@
     </p:ext>
   </p:extLst>
 </p:presentation>
+</file>
+
+<file path=ppt/revisionInfo.xml><?xml version="1.0" encoding="utf-8"?>
+<p1510:revInfo xmlns:a="http://schemas.openxmlformats.org/drawingml/2006/main" xmlns:r="http://schemas.openxmlformats.org/officeDocument/2006/relationships" xmlns:p1510="http://schemas.microsoft.com/office/powerpoint/2015/10/main">
+  <p1510:revLst>
+    <p1510:client id="{D48868C0-DAC2-ACC6-C950-E70ACE510E49}" v="14" dt="2023-11-21T08:23:53.828"/>
+  </p1510:revLst>
+</p1510:revInfo>
 </file>
 
 <file path=ppt/notesMasters/notesMaster1.xml><?xml version="1.0" encoding="utf-8"?>
@@ -21956,7 +21957,7 @@
           <a:noFill/>
         </p:spPr>
         <p:txBody>
-          <a:bodyPr wrap="square">
+          <a:bodyPr wrap="square" lIns="91440" tIns="45720" rIns="91440" bIns="45720" anchor="t">
             <a:spAutoFit/>
           </a:bodyPr>
           <a:lstStyle/>
@@ -22071,7 +22072,7 @@
                 <a:solidFill>
                   <a:srgbClr val="FDFDFD"/>
                 </a:solidFill>
-                <a:latin typeface="Play" panose="020B0604020202020204" charset="0"/>
+                <a:latin typeface="Play"/>
                 <a:sym typeface="Wingdings" panose="05000000000000000000" pitchFamily="2" charset="2"/>
               </a:rPr>
               <a:t></a:t>
@@ -22081,9 +22082,9 @@
                 <a:solidFill>
                   <a:srgbClr val="FDFDFD"/>
                 </a:solidFill>
-                <a:latin typeface="Play" panose="020B0604020202020204" charset="0"/>
+                <a:latin typeface="Play"/>
               </a:rPr>
-              <a:t> Jeder ist willkommen!</a:t>
+              <a:t> Alle sind willkommen!</a:t>
             </a:r>
           </a:p>
         </p:txBody>
@@ -22174,7 +22175,7 @@
           <a:noFill/>
         </p:spPr>
         <p:txBody>
-          <a:bodyPr wrap="square">
+          <a:bodyPr wrap="square" lIns="91440" tIns="45720" rIns="91440" bIns="45720" anchor="t">
             <a:spAutoFit/>
           </a:bodyPr>
           <a:lstStyle/>
@@ -22227,10 +22228,16 @@
                 <a:solidFill>
                   <a:schemeClr val="bg1"/>
                 </a:solidFill>
-                <a:latin typeface="Play" panose="020B0604020202020204" charset="0"/>
+                <a:latin typeface="Play"/>
               </a:rPr>
-              <a:t>Merch für alle Teilnehmer</a:t>
+              <a:t>Merch für alle Teilnehmenden</a:t>
             </a:r>
+            <a:endParaRPr lang="de-DE" sz="2800" dirty="0">
+              <a:solidFill>
+                <a:schemeClr val="bg1"/>
+              </a:solidFill>
+              <a:latin typeface="Play" panose="020B0604020202020204" charset="0"/>
+            </a:endParaRPr>
           </a:p>
         </p:txBody>
       </p:sp>

</xml_diff>